<commit_message>
Code examples + new slides
</commit_message>
<xml_diff>
--- a/Collaterals/IntelMakersCourse - class 3.pptx
+++ b/Collaterals/IntelMakersCourse - class 3.pptx
@@ -279,7 +279,7 @@
                 <a:latin typeface="Intel Clear"/>
               </a:rPr>
               <a:pPr/>
-              <a:t>9/19/2024</a:t>
+              <a:t>3/6/2025</a:t>
             </a:fld>
             <a:endParaRPr lang="en-US" dirty="0">
               <a:latin typeface="Intel Clear"/>
@@ -459,7 +459,7 @@
             <a:fld id="{ED7FC5FE-6F0D-D34A-8EE6-C95B4F5F4DC8}" type="datetimeFigureOut">
               <a:rPr lang="en-US" smtClean="0"/>
               <a:pPr/>
-              <a:t>9/15/2024</a:t>
+              <a:t>3/6/2025</a:t>
             </a:fld>
             <a:endParaRPr lang="en-US" dirty="0"/>
           </a:p>
@@ -1001,7 +1001,7 @@
           <a:noFill/>
           <a:extLst>
             <a:ext uri="{909E8E84-426E-40dd-AFC4-6F175D3DCCD1}">
-              <a14:hiddenFill xmlns="" xmlns:a14="http://schemas.microsoft.com/office/drawing/2010/main">
+              <a14:hiddenFill xmlns:a14="http://schemas.microsoft.com/office/drawing/2010/main" xmlns="">
                 <a:solidFill>
                   <a:srgbClr val="FFFFFF"/>
                 </a:solidFill>
@@ -3875,7 +3875,7 @@
           <a:noFill/>
           <a:extLst>
             <a:ext uri="{909E8E84-426E-40dd-AFC4-6F175D3DCCD1}">
-              <a14:hiddenFill xmlns="" xmlns:a14="http://schemas.microsoft.com/office/drawing/2010/main">
+              <a14:hiddenFill xmlns:a14="http://schemas.microsoft.com/office/drawing/2010/main" xmlns="">
                 <a:solidFill>
                   <a:srgbClr val="FFFFFF"/>
                 </a:solidFill>
@@ -4044,7 +4044,7 @@
           <a:noFill/>
           <a:extLst>
             <a:ext uri="{909E8E84-426E-40dd-AFC4-6F175D3DCCD1}">
-              <a14:hiddenFill xmlns="" xmlns:a14="http://schemas.microsoft.com/office/drawing/2010/main">
+              <a14:hiddenFill xmlns:a14="http://schemas.microsoft.com/office/drawing/2010/main" xmlns="">
                 <a:solidFill>
                   <a:srgbClr val="FFFFFF"/>
                 </a:solidFill>
@@ -4439,7 +4439,7 @@
           <a:noFill/>
           <a:extLst>
             <a:ext uri="{909E8E84-426E-40dd-AFC4-6F175D3DCCD1}">
-              <a14:hiddenFill xmlns="" xmlns:a14="http://schemas.microsoft.com/office/drawing/2010/main">
+              <a14:hiddenFill xmlns:a14="http://schemas.microsoft.com/office/drawing/2010/main" xmlns="">
                 <a:solidFill>
                   <a:srgbClr val="FFFFFF"/>
                 </a:solidFill>
@@ -4742,7 +4742,7 @@
           <a:noFill/>
           <a:extLst>
             <a:ext uri="{909E8E84-426E-40dd-AFC4-6F175D3DCCD1}">
-              <a14:hiddenFill xmlns="" xmlns:a14="http://schemas.microsoft.com/office/drawing/2010/main">
+              <a14:hiddenFill xmlns:a14="http://schemas.microsoft.com/office/drawing/2010/main" xmlns="">
                 <a:solidFill>
                   <a:srgbClr val="FFFFFF"/>
                 </a:solidFill>
@@ -5078,7 +5078,7 @@
           <a:noFill/>
           <a:extLst>
             <a:ext uri="{909E8E84-426E-40dd-AFC4-6F175D3DCCD1}">
-              <a14:hiddenFill xmlns="" xmlns:a14="http://schemas.microsoft.com/office/drawing/2010/main">
+              <a14:hiddenFill xmlns:a14="http://schemas.microsoft.com/office/drawing/2010/main" xmlns="">
                 <a:solidFill>
                   <a:srgbClr val="FFFFFF"/>
                 </a:solidFill>
@@ -9294,7 +9294,7 @@
           <a:noFill/>
           <a:extLst>
             <a:ext uri="{909E8E84-426E-40dd-AFC4-6F175D3DCCD1}">
-              <a14:hiddenFill xmlns="" xmlns:a14="http://schemas.microsoft.com/office/drawing/2010/main">
+              <a14:hiddenFill xmlns:a14="http://schemas.microsoft.com/office/drawing/2010/main" xmlns="">
                 <a:solidFill>
                   <a:srgbClr val="FFFFFF"/>
                 </a:solidFill>
@@ -9538,7 +9538,7 @@
           <a:noFill/>
           <a:extLst>
             <a:ext uri="{909E8E84-426E-40dd-AFC4-6F175D3DCCD1}">
-              <a14:hiddenFill xmlns="" xmlns:a14="http://schemas.microsoft.com/office/drawing/2010/main">
+              <a14:hiddenFill xmlns:a14="http://schemas.microsoft.com/office/drawing/2010/main" xmlns="">
                 <a:solidFill>
                   <a:srgbClr val="FFFFFF"/>
                 </a:solidFill>
@@ -10963,7 +10963,7 @@
           <a:noFill/>
           <a:extLst>
             <a:ext uri="{909E8E84-426E-40dd-AFC4-6F175D3DCCD1}">
-              <a14:hiddenFill xmlns="" xmlns:a14="http://schemas.microsoft.com/office/drawing/2010/main">
+              <a14:hiddenFill xmlns:a14="http://schemas.microsoft.com/office/drawing/2010/main" xmlns="">
                 <a:solidFill>
                   <a:srgbClr val="FFFFFF"/>
                 </a:solidFill>
@@ -11580,7 +11580,7 @@
           <a:noFill/>
           <a:extLst>
             <a:ext uri="{909E8E84-426E-40dd-AFC4-6F175D3DCCD1}">
-              <a14:hiddenFill xmlns="" xmlns:a14="http://schemas.microsoft.com/office/drawing/2010/main">
+              <a14:hiddenFill xmlns:a14="http://schemas.microsoft.com/office/drawing/2010/main" xmlns="">
                 <a:solidFill>
                   <a:srgbClr val="FFFFFF"/>
                 </a:solidFill>
@@ -12367,8 +12367,15 @@
             </a:pPr>
             <a:r>
               <a:rPr lang="en-US" sz="1400" dirty="0"/>
-              <a:t>Two DAC (Digital to analog)</a:t>
-            </a:r>
+              <a:t>Two DAC (Digital to analog) – Not supported on ESP32-S3 </a:t>
+            </a:r>
+            <a:r>
+              <a:rPr lang="en-US" sz="1400" dirty="0">
+                <a:sym typeface="Wingdings" panose="05000000000000000000" pitchFamily="2" charset="2"/>
+              </a:rPr>
+              <a:t></a:t>
+            </a:r>
+            <a:endParaRPr lang="en-US" sz="1400" dirty="0"/>
           </a:p>
           <a:p>
             <a:pPr marL="171446" indent="-171446">
@@ -12391,10 +12398,109 @@
               <a:buFont typeface="Arial" panose="020B0604020202020204" pitchFamily="34" charset="0"/>
               <a:buChar char="•"/>
             </a:pPr>
+            <a:r>
+              <a:rPr lang="en-US" sz="1400" dirty="0"/>
+              <a:t>Performance:</a:t>
+            </a:r>
+          </a:p>
+          <a:p>
+            <a:pPr marL="396871" lvl="1" indent="-171446">
+              <a:spcBef>
+                <a:spcPts val="600"/>
+              </a:spcBef>
+              <a:buFont typeface="Arial" panose="020B0604020202020204" pitchFamily="34" charset="0"/>
+              <a:buChar char="•"/>
+            </a:pPr>
+            <a:r>
+              <a:rPr lang="en-US" sz="1400" dirty="0"/>
+              <a:t>ESP32 (LX6) CoreMark: 500 per CPU</a:t>
+            </a:r>
+          </a:p>
+          <a:p>
+            <a:pPr marL="396871" lvl="1" indent="-171446">
+              <a:spcBef>
+                <a:spcPts val="600"/>
+              </a:spcBef>
+              <a:buFont typeface="Arial" panose="020B0604020202020204" pitchFamily="34" charset="0"/>
+              <a:buChar char="•"/>
+            </a:pPr>
+            <a:r>
+              <a:rPr lang="en-US" sz="1400" dirty="0"/>
+              <a:t>ESP32-S3 (LX7) CoreMark: 612 per CPU!</a:t>
+            </a:r>
+          </a:p>
+          <a:p>
+            <a:pPr marL="396871" lvl="1" indent="-171446">
+              <a:spcBef>
+                <a:spcPts val="600"/>
+              </a:spcBef>
+              <a:buFont typeface="Arial" panose="020B0604020202020204" pitchFamily="34" charset="0"/>
+              <a:buChar char="•"/>
+            </a:pPr>
             <a:endParaRPr lang="en-US" sz="1400" dirty="0"/>
           </a:p>
         </p:txBody>
       </p:sp>
+      <p:pic>
+        <p:nvPicPr>
+          <p:cNvPr id="6" name="Picture 5">
+            <a:extLst>
+              <a:ext uri="{FF2B5EF4-FFF2-40B4-BE49-F238E27FC236}">
+                <a16:creationId xmlns:a16="http://schemas.microsoft.com/office/drawing/2014/main" id="{63CCBE6F-8C20-160A-4AE7-2DC8AD1BEDAB}"/>
+              </a:ext>
+            </a:extLst>
+          </p:cNvPr>
+          <p:cNvPicPr>
+            <a:picLocks noChangeAspect="1"/>
+          </p:cNvPicPr>
+          <p:nvPr/>
+        </p:nvPicPr>
+        <p:blipFill>
+          <a:blip r:embed="rId2"/>
+          <a:stretch>
+            <a:fillRect/>
+          </a:stretch>
+        </p:blipFill>
+        <p:spPr>
+          <a:xfrm>
+            <a:off x="600075" y="2699227"/>
+            <a:ext cx="6229350" cy="717667"/>
+          </a:xfrm>
+          <a:prstGeom prst="rect">
+            <a:avLst/>
+          </a:prstGeom>
+        </p:spPr>
+      </p:pic>
+      <p:pic>
+        <p:nvPicPr>
+          <p:cNvPr id="8" name="Picture 7">
+            <a:extLst>
+              <a:ext uri="{FF2B5EF4-FFF2-40B4-BE49-F238E27FC236}">
+                <a16:creationId xmlns:a16="http://schemas.microsoft.com/office/drawing/2014/main" id="{F7D3E84F-47C1-3C28-C03B-F5D1D7D8BF53}"/>
+              </a:ext>
+            </a:extLst>
+          </p:cNvPr>
+          <p:cNvPicPr>
+            <a:picLocks noChangeAspect="1"/>
+          </p:cNvPicPr>
+          <p:nvPr/>
+        </p:nvPicPr>
+        <p:blipFill>
+          <a:blip r:embed="rId3"/>
+          <a:stretch>
+            <a:fillRect/>
+          </a:stretch>
+        </p:blipFill>
+        <p:spPr>
+          <a:xfrm>
+            <a:off x="650856" y="3416894"/>
+            <a:ext cx="6221496" cy="530109"/>
+          </a:xfrm>
+          <a:prstGeom prst="rect">
+            <a:avLst/>
+          </a:prstGeom>
+        </p:spPr>
+      </p:pic>
     </p:spTree>
     <p:extLst>
       <p:ext uri="{BB962C8B-B14F-4D97-AF65-F5344CB8AC3E}">

</xml_diff>